<commit_message>
Build and QA Cleanup
</commit_message>
<xml_diff>
--- a/input/images-source/AEOB_Packet.pptx
+++ b/input/images-source/AEOB_Packet.pptx
@@ -198,7 +198,7 @@
           <a:p>
             <a:fld id="{A2C95764-E0FA-0A43-A86C-F3BAB03EE38B}" type="datetimeFigureOut">
               <a:rPr lang="en-US" smtClean="0"/>
-              <a:t>4/4/2025</a:t>
+              <a:t>8/13/2025</a:t>
             </a:fld>
             <a:endParaRPr lang="en-US"/>
           </a:p>
@@ -804,7 +804,7 @@
           <a:p>
             <a:fld id="{18271F4C-9DA1-544F-94AC-914D946BC5DE}" type="datetimeFigureOut">
               <a:rPr lang="en-US" smtClean="0"/>
-              <a:t>4/4/2025</a:t>
+              <a:t>8/13/2025</a:t>
             </a:fld>
             <a:endParaRPr lang="en-US"/>
           </a:p>
@@ -1002,7 +1002,7 @@
           <a:p>
             <a:fld id="{18271F4C-9DA1-544F-94AC-914D946BC5DE}" type="datetimeFigureOut">
               <a:rPr lang="en-US" smtClean="0"/>
-              <a:t>4/4/2025</a:t>
+              <a:t>8/13/2025</a:t>
             </a:fld>
             <a:endParaRPr lang="en-US"/>
           </a:p>
@@ -1210,7 +1210,7 @@
           <a:p>
             <a:fld id="{18271F4C-9DA1-544F-94AC-914D946BC5DE}" type="datetimeFigureOut">
               <a:rPr lang="en-US" smtClean="0"/>
-              <a:t>4/4/2025</a:t>
+              <a:t>8/13/2025</a:t>
             </a:fld>
             <a:endParaRPr lang="en-US"/>
           </a:p>
@@ -1408,7 +1408,7 @@
           <a:p>
             <a:fld id="{18271F4C-9DA1-544F-94AC-914D946BC5DE}" type="datetimeFigureOut">
               <a:rPr lang="en-US" smtClean="0"/>
-              <a:t>4/4/2025</a:t>
+              <a:t>8/13/2025</a:t>
             </a:fld>
             <a:endParaRPr lang="en-US"/>
           </a:p>
@@ -1683,7 +1683,7 @@
           <a:p>
             <a:fld id="{18271F4C-9DA1-544F-94AC-914D946BC5DE}" type="datetimeFigureOut">
               <a:rPr lang="en-US" smtClean="0"/>
-              <a:t>4/4/2025</a:t>
+              <a:t>8/13/2025</a:t>
             </a:fld>
             <a:endParaRPr lang="en-US"/>
           </a:p>
@@ -1948,7 +1948,7 @@
           <a:p>
             <a:fld id="{18271F4C-9DA1-544F-94AC-914D946BC5DE}" type="datetimeFigureOut">
               <a:rPr lang="en-US" smtClean="0"/>
-              <a:t>4/4/2025</a:t>
+              <a:t>8/13/2025</a:t>
             </a:fld>
             <a:endParaRPr lang="en-US"/>
           </a:p>
@@ -2360,7 +2360,7 @@
           <a:p>
             <a:fld id="{18271F4C-9DA1-544F-94AC-914D946BC5DE}" type="datetimeFigureOut">
               <a:rPr lang="en-US" smtClean="0"/>
-              <a:t>4/4/2025</a:t>
+              <a:t>8/13/2025</a:t>
             </a:fld>
             <a:endParaRPr lang="en-US"/>
           </a:p>
@@ -2501,7 +2501,7 @@
           <a:p>
             <a:fld id="{18271F4C-9DA1-544F-94AC-914D946BC5DE}" type="datetimeFigureOut">
               <a:rPr lang="en-US" smtClean="0"/>
-              <a:t>4/4/2025</a:t>
+              <a:t>8/13/2025</a:t>
             </a:fld>
             <a:endParaRPr lang="en-US"/>
           </a:p>
@@ -2614,7 +2614,7 @@
           <a:p>
             <a:fld id="{18271F4C-9DA1-544F-94AC-914D946BC5DE}" type="datetimeFigureOut">
               <a:rPr lang="en-US" smtClean="0"/>
-              <a:t>4/4/2025</a:t>
+              <a:t>8/13/2025</a:t>
             </a:fld>
             <a:endParaRPr lang="en-US"/>
           </a:p>
@@ -2925,7 +2925,7 @@
           <a:p>
             <a:fld id="{18271F4C-9DA1-544F-94AC-914D946BC5DE}" type="datetimeFigureOut">
               <a:rPr lang="en-US" smtClean="0"/>
-              <a:t>4/4/2025</a:t>
+              <a:t>8/13/2025</a:t>
             </a:fld>
             <a:endParaRPr lang="en-US"/>
           </a:p>
@@ -3213,7 +3213,7 @@
           <a:p>
             <a:fld id="{18271F4C-9DA1-544F-94AC-914D946BC5DE}" type="datetimeFigureOut">
               <a:rPr lang="en-US" smtClean="0"/>
-              <a:t>4/4/2025</a:t>
+              <a:t>8/13/2025</a:t>
             </a:fld>
             <a:endParaRPr lang="en-US"/>
           </a:p>
@@ -3454,7 +3454,7 @@
           <a:p>
             <a:fld id="{18271F4C-9DA1-544F-94AC-914D946BC5DE}" type="datetimeFigureOut">
               <a:rPr lang="en-US" smtClean="0"/>
-              <a:t>4/4/2025</a:t>
+              <a:t>8/13/2025</a:t>
             </a:fld>
             <a:endParaRPr lang="en-US"/>
           </a:p>
@@ -4078,23 +4078,6 @@
                 <a:defRPr/>
               </a:pPr>
               <a:r>
-                <a:rPr kumimoji="0" lang="en-US" sz="1050" b="1" i="0" u="none" strike="noStrike" kern="0" cap="none" spc="0" normalizeH="0" baseline="0" noProof="0" dirty="0" err="1">
-                  <a:ln>
-                    <a:noFill/>
-                  </a:ln>
-                  <a:solidFill>
-                    <a:prstClr val="white"/>
-                  </a:solidFill>
-                  <a:effectLst/>
-                  <a:uLnTx/>
-                  <a:uFillTx/>
-                  <a:latin typeface="Arial" panose="020B0604020202020204"/>
-                  <a:ea typeface="+mn-ea"/>
-                  <a:cs typeface="+mn-cs"/>
-                </a:rPr>
-                <a:t>HRex</a:t>
-              </a:r>
-              <a:r>
                 <a:rPr kumimoji="0" lang="en-US" sz="1050" b="1" i="0" u="none" strike="noStrike" kern="0" cap="none" spc="0" normalizeH="0" baseline="0" noProof="0" dirty="0">
                   <a:ln>
                     <a:noFill/>
@@ -4109,7 +4092,7 @@
                   <a:ea typeface="+mn-ea"/>
                   <a:cs typeface="+mn-cs"/>
                 </a:rPr>
-                <a:t> Patient</a:t>
+                <a:t>US Core Patient</a:t>
               </a:r>
             </a:p>
           </p:txBody>
@@ -7486,21 +7469,6 @@
                 <a:defRPr/>
               </a:pPr>
               <a:r>
-                <a:rPr kumimoji="0" lang="en-US" sz="1050" b="1" i="0" u="none" strike="noStrike" kern="0" cap="none" spc="0" normalizeH="0" baseline="0" noProof="0" dirty="0" err="1">
-                  <a:ln>
-                    <a:noFill/>
-                  </a:ln>
-                  <a:solidFill>
-                    <a:prstClr val="white"/>
-                  </a:solidFill>
-                  <a:effectLst/>
-                  <a:uLnTx/>
-                  <a:uFillTx/>
-                  <a:latin typeface="Arial" panose="020B0604020202020204"/>
-                </a:rPr>
-                <a:t>HRex</a:t>
-              </a:r>
-              <a:r>
                 <a:rPr kumimoji="0" lang="en-US" sz="1050" b="1" i="0" u="none" strike="noStrike" kern="0" cap="none" spc="0" normalizeH="0" baseline="0" noProof="0" dirty="0">
                   <a:ln>
                     <a:noFill/>
@@ -7513,7 +7481,7 @@
                   <a:uFillTx/>
                   <a:latin typeface="Arial" panose="020B0604020202020204"/>
                 </a:rPr>
-                <a:t> Patient</a:t>
+                <a:t>US Core Patient</a:t>
               </a:r>
             </a:p>
           </p:txBody>
@@ -10990,23 +10958,6 @@
                 <a:defRPr/>
               </a:pPr>
               <a:r>
-                <a:rPr kumimoji="0" lang="en-US" sz="1050" b="1" i="0" u="none" strike="noStrike" kern="0" cap="none" spc="0" normalizeH="0" baseline="0" noProof="0" dirty="0" err="1">
-                  <a:ln>
-                    <a:noFill/>
-                  </a:ln>
-                  <a:solidFill>
-                    <a:prstClr val="white"/>
-                  </a:solidFill>
-                  <a:effectLst/>
-                  <a:uLnTx/>
-                  <a:uFillTx/>
-                  <a:latin typeface="Arial" panose="020B0604020202020204"/>
-                  <a:ea typeface="+mn-ea"/>
-                  <a:cs typeface="+mn-cs"/>
-                </a:rPr>
-                <a:t>HRex</a:t>
-              </a:r>
-              <a:r>
                 <a:rPr kumimoji="0" lang="en-US" sz="1050" b="1" i="0" u="none" strike="noStrike" kern="0" cap="none" spc="0" normalizeH="0" baseline="0" noProof="0" dirty="0">
                   <a:ln>
                     <a:noFill/>
@@ -11021,7 +10972,7 @@
                   <a:ea typeface="+mn-ea"/>
                   <a:cs typeface="+mn-cs"/>
                 </a:rPr>
-                <a:t> Patient</a:t>
+                <a:t>US Core Patient</a:t>
               </a:r>
             </a:p>
           </p:txBody>
@@ -17568,23 +17519,6 @@
                 <a:defRPr/>
               </a:pPr>
               <a:r>
-                <a:rPr kumimoji="0" lang="en-US" sz="1050" b="1" i="0" u="none" strike="noStrike" kern="0" cap="none" spc="0" normalizeH="0" baseline="0" noProof="0" dirty="0" err="1">
-                  <a:ln>
-                    <a:noFill/>
-                  </a:ln>
-                  <a:solidFill>
-                    <a:prstClr val="white"/>
-                  </a:solidFill>
-                  <a:effectLst/>
-                  <a:uLnTx/>
-                  <a:uFillTx/>
-                  <a:latin typeface="Arial" panose="020B0604020202020204"/>
-                  <a:ea typeface="+mn-ea"/>
-                  <a:cs typeface="+mn-cs"/>
-                </a:rPr>
-                <a:t>HRex</a:t>
-              </a:r>
-              <a:r>
                 <a:rPr kumimoji="0" lang="en-US" sz="1050" b="1" i="0" u="none" strike="noStrike" kern="0" cap="none" spc="0" normalizeH="0" baseline="0" noProof="0" dirty="0">
                   <a:ln>
                     <a:noFill/>
@@ -17599,7 +17533,7 @@
                   <a:ea typeface="+mn-ea"/>
                   <a:cs typeface="+mn-cs"/>
                 </a:rPr>
-                <a:t> Patient</a:t>
+                <a:t>US Core Patient</a:t>
               </a:r>
             </a:p>
           </p:txBody>

</xml_diff>